<commit_message>
Model Schema Migration complete
All Html metadata and types migrated to proto.
</commit_message>
<xml_diff>
--- a/presentations/Initiative-Process.pptx
+++ b/presentations/Initiative-Process.pptx
@@ -3422,7 +3422,7 @@
           <a:p>
             <a:fld id="{A013F9EE-546F-F94B-AA97-D1AE3791A433}" type="datetimeFigureOut">
               <a:rPr lang="en-US" smtClean="0"/>
-              <a:t>4/23/19</a:t>
+              <a:t>5/2/19</a:t>
             </a:fld>
             <a:endParaRPr lang="en-US"/>
           </a:p>
@@ -4004,7 +4004,7 @@
           <a:p>
             <a:fld id="{8FB96D9D-38FC-CC46-A0CB-E098219B0086}" type="datetime1">
               <a:rPr lang="en-US" smtClean="0"/>
-              <a:t>4/23/19</a:t>
+              <a:t>5/2/19</a:t>
             </a:fld>
             <a:endParaRPr lang="en-US"/>
           </a:p>
@@ -4210,7 +4210,7 @@
           <a:p>
             <a:fld id="{942A70B8-4309-F34F-96D0-97FCD407878B}" type="datetime1">
               <a:rPr lang="en-US" smtClean="0"/>
-              <a:t>4/23/19</a:t>
+              <a:t>5/2/19</a:t>
             </a:fld>
             <a:endParaRPr lang="en-US"/>
           </a:p>
@@ -4421,7 +4421,7 @@
           <a:p>
             <a:fld id="{89C80109-A0CB-5341-BC57-ABFEFDDC8893}" type="datetime1">
               <a:rPr lang="en-US" smtClean="0"/>
-              <a:t>4/23/19</a:t>
+              <a:t>5/2/19</a:t>
             </a:fld>
             <a:endParaRPr lang="en-US"/>
           </a:p>
@@ -4622,7 +4622,7 @@
           <a:p>
             <a:fld id="{BAA7B42C-993D-274B-B3BA-F75F4CCEEEC2}" type="datetime1">
               <a:rPr lang="en-US" smtClean="0"/>
-              <a:t>4/23/19</a:t>
+              <a:t>5/2/19</a:t>
             </a:fld>
             <a:endParaRPr lang="en-US"/>
           </a:p>
@@ -4905,7 +4905,7 @@
           <a:p>
             <a:fld id="{8F5AFB48-8B18-D340-A907-4693B63406A7}" type="datetime1">
               <a:rPr lang="en-US" smtClean="0"/>
-              <a:t>4/23/19</a:t>
+              <a:t>5/2/19</a:t>
             </a:fld>
             <a:endParaRPr lang="en-US"/>
           </a:p>
@@ -5179,7 +5179,7 @@
           <a:p>
             <a:fld id="{79170321-5248-5D47-965E-40E4540BD6B0}" type="datetime1">
               <a:rPr lang="en-US" smtClean="0"/>
-              <a:t>4/23/19</a:t>
+              <a:t>5/2/19</a:t>
             </a:fld>
             <a:endParaRPr lang="en-US"/>
           </a:p>
@@ -5594,7 +5594,7 @@
           <a:p>
             <a:fld id="{E8E7030F-BB52-314F-94F2-2E12B55397BB}" type="datetime1">
               <a:rPr lang="en-US" smtClean="0"/>
-              <a:t>4/23/19</a:t>
+              <a:t>5/2/19</a:t>
             </a:fld>
             <a:endParaRPr lang="en-US"/>
           </a:p>
@@ -5738,7 +5738,7 @@
           <a:p>
             <a:fld id="{C27E58A0-BB55-0148-878B-2816E139BA78}" type="datetime1">
               <a:rPr lang="en-US" smtClean="0"/>
-              <a:t>4/23/19</a:t>
+              <a:t>5/2/19</a:t>
             </a:fld>
             <a:endParaRPr lang="en-US"/>
           </a:p>
@@ -5854,7 +5854,7 @@
           <a:p>
             <a:fld id="{5116CE3B-2606-EB4F-B179-D486B484EF6E}" type="datetime1">
               <a:rPr lang="en-US" smtClean="0"/>
-              <a:t>4/23/19</a:t>
+              <a:t>5/2/19</a:t>
             </a:fld>
             <a:endParaRPr lang="en-US"/>
           </a:p>
@@ -6168,7 +6168,7 @@
           <a:p>
             <a:fld id="{89F1CDCB-590D-CB49-8A9B-46077D7ADF33}" type="datetime1">
               <a:rPr lang="en-US" smtClean="0"/>
-              <a:t>4/23/19</a:t>
+              <a:t>5/2/19</a:t>
             </a:fld>
             <a:endParaRPr lang="en-US"/>
           </a:p>
@@ -6459,7 +6459,7 @@
           <a:p>
             <a:fld id="{7D96C9D8-BC1D-4648-B77D-F9F743ABE8E0}" type="datetime1">
               <a:rPr lang="en-US" smtClean="0"/>
-              <a:t>4/23/19</a:t>
+              <a:t>5/2/19</a:t>
             </a:fld>
             <a:endParaRPr lang="en-US"/>
           </a:p>
@@ -6703,7 +6703,7 @@
           <a:p>
             <a:fld id="{6AA11AF7-B255-CD4A-98A8-E461D6BAC0E7}" type="datetime1">
               <a:rPr lang="en-US" smtClean="0"/>
-              <a:t>4/23/19</a:t>
+              <a:t>5/2/19</a:t>
             </a:fld>
             <a:endParaRPr lang="en-US"/>
           </a:p>
@@ -10782,7 +10782,7 @@
         <p:spPr/>
         <p:txBody>
           <a:bodyPr>
-            <a:normAutofit lnSpcReduction="10000"/>
+            <a:normAutofit/>
           </a:bodyPr>
           <a:lstStyle/>
           <a:p>
@@ -10821,7 +10821,7 @@
             <a:pPr lvl="1"/>
             <a:r>
               <a:rPr lang="en-US" dirty="0"/>
-              <a:t>Core Metadata for artifacts: inline HTML attributes and JSON?  Or just JSON or other?</a:t>
+              <a:t>Core Metadata model for artifacts</a:t>
             </a:r>
           </a:p>
           <a:p>
@@ -10863,7 +10863,7 @@
             <a:pPr lvl="1"/>
             <a:r>
               <a:rPr lang="en-US" dirty="0"/>
-              <a:t>SDK/Object Model?</a:t>
+              <a:t>Tools, SDK</a:t>
             </a:r>
           </a:p>
           <a:p>
@@ -11789,6 +11789,21 @@
 </file>
 
 <file path=customXml/item1.xml><?xml version="1.0" encoding="utf-8"?>
+<?mso-contentType ?>
+<FormTemplates xmlns="http://schemas.microsoft.com/sharepoint/v3/contenttype/forms">
+  <Display>DocumentLibraryForm</Display>
+  <Edit>DocumentLibraryForm</Edit>
+  <New>DocumentLibraryForm</New>
+</FormTemplates>
+</file>
+
+<file path=customXml/item2.xml><?xml version="1.0" encoding="utf-8"?>
+<p:properties xmlns:p="http://schemas.microsoft.com/office/2006/metadata/properties" xmlns:xsi="http://www.w3.org/2001/XMLSchema-instance" xmlns:pc="http://schemas.microsoft.com/office/infopath/2007/PartnerControls">
+  <documentManagement/>
+</p:properties>
+</file>
+
+<file path=customXml/item3.xml><?xml version="1.0" encoding="utf-8"?>
 <ct:contentTypeSchema xmlns:ct="http://schemas.microsoft.com/office/2006/metadata/contentType" xmlns:ma="http://schemas.microsoft.com/office/2006/metadata/properties/metaAttributes" ct:_="" ma:_="" ma:contentTypeName="Document" ma:contentTypeID="0x0101000D5D5817AAF6FF468E5842F2EA41A402" ma:contentTypeVersion="5" ma:contentTypeDescription="Create a new document." ma:contentTypeScope="" ma:versionID="b6717c27019841191da670e59e5b2108">
   <xsd:schema xmlns:xsd="http://www.w3.org/2001/XMLSchema" xmlns:xs="http://www.w3.org/2001/XMLSchema" xmlns:p="http://schemas.microsoft.com/office/2006/metadata/properties" xmlns:ns2="d0b048db-77dc-4b3e-bbad-b83c857b8f52" targetNamespace="http://schemas.microsoft.com/office/2006/metadata/properties" ma:root="true" ma:fieldsID="8024692aff57b51e72d1c6749c4af71d" ns2:_="">
     <xsd:import namespace="d0b048db-77dc-4b3e-bbad-b83c857b8f52"/>
@@ -11940,35 +11955,10 @@
 </ct:contentTypeSchema>
 </file>
 
-<file path=customXml/item2.xml><?xml version="1.0" encoding="utf-8"?>
-<p:properties xmlns:p="http://schemas.microsoft.com/office/2006/metadata/properties" xmlns:xsi="http://www.w3.org/2001/XMLSchema-instance" xmlns:pc="http://schemas.microsoft.com/office/infopath/2007/PartnerControls">
-  <documentManagement/>
-</p:properties>
-</file>
-
-<file path=customXml/item3.xml><?xml version="1.0" encoding="utf-8"?>
-<?mso-contentType ?>
-<FormTemplates xmlns="http://schemas.microsoft.com/sharepoint/v3/contenttype/forms">
-  <Display>DocumentLibraryForm</Display>
-  <Edit>DocumentLibraryForm</Edit>
-  <New>DocumentLibraryForm</New>
-</FormTemplates>
-</file>
-
 <file path=customXml/itemProps1.xml><?xml version="1.0" encoding="utf-8"?>
-<ds:datastoreItem xmlns:ds="http://schemas.openxmlformats.org/officeDocument/2006/customXml" ds:itemID="{960CB16A-B668-4E1F-9711-68887A92012A}">
+<ds:datastoreItem xmlns:ds="http://schemas.openxmlformats.org/officeDocument/2006/customXml" ds:itemID="{8300740F-8DFB-471C-9B1F-015DD41307B1}">
   <ds:schemaRefs>
-    <ds:schemaRef ds:uri="http://schemas.microsoft.com/office/2006/metadata/contentType"/>
-    <ds:schemaRef ds:uri="http://schemas.microsoft.com/office/2006/metadata/properties/metaAttributes"/>
-    <ds:schemaRef ds:uri="http://www.w3.org/2001/XMLSchema"/>
-    <ds:schemaRef ds:uri="http://schemas.microsoft.com/office/2006/metadata/properties"/>
-    <ds:schemaRef ds:uri="d0b048db-77dc-4b3e-bbad-b83c857b8f52"/>
-    <ds:schemaRef ds:uri="http://schemas.microsoft.com/office/2006/documentManagement/types"/>
-    <ds:schemaRef ds:uri="http://schemas.microsoft.com/office/infopath/2007/PartnerControls"/>
-    <ds:schemaRef ds:uri="http://schemas.openxmlformats.org/package/2006/metadata/core-properties"/>
-    <ds:schemaRef ds:uri="http://purl.org/dc/elements/1.1/"/>
-    <ds:schemaRef ds:uri="http://purl.org/dc/terms/"/>
-    <ds:schemaRef ds:uri="http://schemas.microsoft.com/internal/obd"/>
+    <ds:schemaRef ds:uri="http://schemas.microsoft.com/sharepoint/v3/contenttype/forms"/>
   </ds:schemaRefs>
 </ds:datastoreItem>
 </file>
@@ -11990,9 +11980,19 @@
 </file>
 
 <file path=customXml/itemProps3.xml><?xml version="1.0" encoding="utf-8"?>
-<ds:datastoreItem xmlns:ds="http://schemas.openxmlformats.org/officeDocument/2006/customXml" ds:itemID="{8300740F-8DFB-471C-9B1F-015DD41307B1}">
+<ds:datastoreItem xmlns:ds="http://schemas.openxmlformats.org/officeDocument/2006/customXml" ds:itemID="{960CB16A-B668-4E1F-9711-68887A92012A}">
   <ds:schemaRefs>
-    <ds:schemaRef ds:uri="http://schemas.microsoft.com/sharepoint/v3/contenttype/forms"/>
+    <ds:schemaRef ds:uri="http://schemas.microsoft.com/office/2006/metadata/contentType"/>
+    <ds:schemaRef ds:uri="http://schemas.microsoft.com/office/2006/metadata/properties/metaAttributes"/>
+    <ds:schemaRef ds:uri="http://www.w3.org/2001/XMLSchema"/>
+    <ds:schemaRef ds:uri="http://schemas.microsoft.com/office/2006/metadata/properties"/>
+    <ds:schemaRef ds:uri="d0b048db-77dc-4b3e-bbad-b83c857b8f52"/>
+    <ds:schemaRef ds:uri="http://schemas.microsoft.com/office/2006/documentManagement/types"/>
+    <ds:schemaRef ds:uri="http://schemas.microsoft.com/office/infopath/2007/PartnerControls"/>
+    <ds:schemaRef ds:uri="http://schemas.openxmlformats.org/package/2006/metadata/core-properties"/>
+    <ds:schemaRef ds:uri="http://purl.org/dc/elements/1.1/"/>
+    <ds:schemaRef ds:uri="http://purl.org/dc/terms/"/>
+    <ds:schemaRef ds:uri="http://schemas.microsoft.com/internal/obd"/>
   </ds:schemaRefs>
 </ds:datastoreItem>
 </file>
</xml_diff>